<commit_message>
Footer Nav Bar corrected
</commit_message>
<xml_diff>
--- a/Projects/learning-methodology/presentations/HOW TO STUDY & LEARN A DISCIPLINE.pptx
+++ b/Projects/learning-methodology/presentations/HOW TO STUDY & LEARN A DISCIPLINE.pptx
@@ -5,7 +5,7 @@
     <p:sldMasterId id="2147483648" r:id="rId4"/>
   </p:sldMasterIdLst>
   <p:notesMasterIdLst>
-    <p:notesMasterId r:id="rId36"/>
+    <p:notesMasterId r:id="rId14"/>
   </p:notesMasterIdLst>
   <p:sldIdLst>
     <p:sldId id="256" r:id="rId5"/>
@@ -17,28 +17,6 @@
     <p:sldId id="260" r:id="rId11"/>
     <p:sldId id="287" r:id="rId12"/>
     <p:sldId id="288" r:id="rId13"/>
-    <p:sldId id="265" r:id="rId14"/>
-    <p:sldId id="266" r:id="rId15"/>
-    <p:sldId id="267" r:id="rId16"/>
-    <p:sldId id="268" r:id="rId17"/>
-    <p:sldId id="269" r:id="rId18"/>
-    <p:sldId id="270" r:id="rId19"/>
-    <p:sldId id="271" r:id="rId20"/>
-    <p:sldId id="272" r:id="rId21"/>
-    <p:sldId id="273" r:id="rId22"/>
-    <p:sldId id="274" r:id="rId23"/>
-    <p:sldId id="275" r:id="rId24"/>
-    <p:sldId id="276" r:id="rId25"/>
-    <p:sldId id="277" r:id="rId26"/>
-    <p:sldId id="278" r:id="rId27"/>
-    <p:sldId id="279" r:id="rId28"/>
-    <p:sldId id="280" r:id="rId29"/>
-    <p:sldId id="281" r:id="rId30"/>
-    <p:sldId id="282" r:id="rId31"/>
-    <p:sldId id="283" r:id="rId32"/>
-    <p:sldId id="284" r:id="rId33"/>
-    <p:sldId id="285" r:id="rId34"/>
-    <p:sldId id="286" r:id="rId35"/>
   </p:sldIdLst>
   <p:sldSz cx="12192000" cy="6858000"/>
   <p:notesSz cx="6858000" cy="9144000"/>
@@ -4703,7 +4681,7 @@
           <a:p>
             <a:fld id="{7C5C6774-3756-4D43-B1BA-8D76346120E7}" type="datetimeFigureOut">
               <a:rPr lang="en-US" smtClean="0"/>
-              <a:t>12/4/2023</a:t>
+              <a:t>11/6/2025</a:t>
             </a:fld>
             <a:endParaRPr lang="en-US" dirty="0"/>
           </a:p>
@@ -5117,7 +5095,7 @@
           <a:p>
             <a:fld id="{04B566B9-5D75-4D5A-8E34-7EE9F2148845}" type="datetimeFigureOut">
               <a:rPr lang="en-US" smtClean="0"/>
-              <a:t>12/4/2023</a:t>
+              <a:t>11/6/2025</a:t>
             </a:fld>
             <a:endParaRPr lang="en-US" dirty="0"/>
           </a:p>
@@ -5315,7 +5293,7 @@
           <a:p>
             <a:fld id="{04B566B9-5D75-4D5A-8E34-7EE9F2148845}" type="datetimeFigureOut">
               <a:rPr lang="en-US" smtClean="0"/>
-              <a:t>12/4/2023</a:t>
+              <a:t>11/6/2025</a:t>
             </a:fld>
             <a:endParaRPr lang="en-US" dirty="0"/>
           </a:p>
@@ -5523,7 +5501,7 @@
           <a:p>
             <a:fld id="{04B566B9-5D75-4D5A-8E34-7EE9F2148845}" type="datetimeFigureOut">
               <a:rPr lang="en-US" smtClean="0"/>
-              <a:t>12/4/2023</a:t>
+              <a:t>11/6/2025</a:t>
             </a:fld>
             <a:endParaRPr lang="en-US" dirty="0"/>
           </a:p>
@@ -5721,7 +5699,7 @@
           <a:p>
             <a:fld id="{04B566B9-5D75-4D5A-8E34-7EE9F2148845}" type="datetimeFigureOut">
               <a:rPr lang="en-US" smtClean="0"/>
-              <a:t>12/4/2023</a:t>
+              <a:t>11/6/2025</a:t>
             </a:fld>
             <a:endParaRPr lang="en-US" dirty="0"/>
           </a:p>
@@ -5996,7 +5974,7 @@
           <a:p>
             <a:fld id="{04B566B9-5D75-4D5A-8E34-7EE9F2148845}" type="datetimeFigureOut">
               <a:rPr lang="en-US" smtClean="0"/>
-              <a:t>12/4/2023</a:t>
+              <a:t>11/6/2025</a:t>
             </a:fld>
             <a:endParaRPr lang="en-US" dirty="0"/>
           </a:p>
@@ -6261,7 +6239,7 @@
           <a:p>
             <a:fld id="{04B566B9-5D75-4D5A-8E34-7EE9F2148845}" type="datetimeFigureOut">
               <a:rPr lang="en-US" smtClean="0"/>
-              <a:t>12/4/2023</a:t>
+              <a:t>11/6/2025</a:t>
             </a:fld>
             <a:endParaRPr lang="en-US" dirty="0"/>
           </a:p>
@@ -6673,7 +6651,7 @@
           <a:p>
             <a:fld id="{04B566B9-5D75-4D5A-8E34-7EE9F2148845}" type="datetimeFigureOut">
               <a:rPr lang="en-US" smtClean="0"/>
-              <a:t>12/4/2023</a:t>
+              <a:t>11/6/2025</a:t>
             </a:fld>
             <a:endParaRPr lang="en-US" dirty="0"/>
           </a:p>
@@ -6814,7 +6792,7 @@
           <a:p>
             <a:fld id="{04B566B9-5D75-4D5A-8E34-7EE9F2148845}" type="datetimeFigureOut">
               <a:rPr lang="en-US" smtClean="0"/>
-              <a:t>12/4/2023</a:t>
+              <a:t>11/6/2025</a:t>
             </a:fld>
             <a:endParaRPr lang="en-US" dirty="0"/>
           </a:p>
@@ -6927,7 +6905,7 @@
           <a:p>
             <a:fld id="{04B566B9-5D75-4D5A-8E34-7EE9F2148845}" type="datetimeFigureOut">
               <a:rPr lang="en-US" smtClean="0"/>
-              <a:t>12/4/2023</a:t>
+              <a:t>11/6/2025</a:t>
             </a:fld>
             <a:endParaRPr lang="en-US" dirty="0"/>
           </a:p>
@@ -7238,7 +7216,7 @@
           <a:p>
             <a:fld id="{04B566B9-5D75-4D5A-8E34-7EE9F2148845}" type="datetimeFigureOut">
               <a:rPr lang="en-US" smtClean="0"/>
-              <a:t>12/4/2023</a:t>
+              <a:t>11/6/2025</a:t>
             </a:fld>
             <a:endParaRPr lang="en-US" dirty="0"/>
           </a:p>
@@ -7526,7 +7504,7 @@
           <a:p>
             <a:fld id="{04B566B9-5D75-4D5A-8E34-7EE9F2148845}" type="datetimeFigureOut">
               <a:rPr lang="en-US" smtClean="0"/>
-              <a:t>12/4/2023</a:t>
+              <a:t>11/6/2025</a:t>
             </a:fld>
             <a:endParaRPr lang="en-US" dirty="0"/>
           </a:p>
@@ -7767,7 +7745,7 @@
           <a:p>
             <a:fld id="{04B566B9-5D75-4D5A-8E34-7EE9F2148845}" type="datetimeFigureOut">
               <a:rPr lang="en-US" smtClean="0"/>
-              <a:t>12/4/2023</a:t>
+              <a:t>11/6/2025</a:t>
             </a:fld>
             <a:endParaRPr lang="en-US" dirty="0"/>
           </a:p>
@@ -9046,306 +9024,6 @@
 </p:sld>
 </file>
 
-<file path=ppt/slides/slide10.xml><?xml version="1.0" encoding="utf-8"?>
-<p:sld xmlns:a="http://schemas.openxmlformats.org/drawingml/2006/main" xmlns:r="http://schemas.openxmlformats.org/officeDocument/2006/relationships" xmlns:p="http://schemas.openxmlformats.org/presentationml/2006/main">
-  <p:cSld>
-    <p:spTree>
-      <p:nvGrpSpPr>
-        <p:cNvPr id="1" name=""/>
-        <p:cNvGrpSpPr/>
-        <p:nvPr/>
-      </p:nvGrpSpPr>
-      <p:grpSpPr>
-        <a:xfrm>
-          <a:off x="0" y="0"/>
-          <a:ext cx="0" cy="0"/>
-          <a:chOff x="0" y="0"/>
-          <a:chExt cx="0" cy="0"/>
-        </a:xfrm>
-      </p:grpSpPr>
-    </p:spTree>
-    <p:extLst>
-      <p:ext uri="{BB962C8B-B14F-4D97-AF65-F5344CB8AC3E}">
-        <p14:creationId xmlns:p14="http://schemas.microsoft.com/office/powerpoint/2010/main" val="3876698817"/>
-      </p:ext>
-    </p:extLst>
-  </p:cSld>
-  <p:clrMapOvr>
-    <a:masterClrMapping/>
-  </p:clrMapOvr>
-</p:sld>
-</file>
-
-<file path=ppt/slides/slide11.xml><?xml version="1.0" encoding="utf-8"?>
-<p:sld xmlns:a="http://schemas.openxmlformats.org/drawingml/2006/main" xmlns:r="http://schemas.openxmlformats.org/officeDocument/2006/relationships" xmlns:p="http://schemas.openxmlformats.org/presentationml/2006/main">
-  <p:cSld>
-    <p:spTree>
-      <p:nvGrpSpPr>
-        <p:cNvPr id="1" name=""/>
-        <p:cNvGrpSpPr/>
-        <p:nvPr/>
-      </p:nvGrpSpPr>
-      <p:grpSpPr>
-        <a:xfrm>
-          <a:off x="0" y="0"/>
-          <a:ext cx="0" cy="0"/>
-          <a:chOff x="0" y="0"/>
-          <a:chExt cx="0" cy="0"/>
-        </a:xfrm>
-      </p:grpSpPr>
-    </p:spTree>
-    <p:extLst>
-      <p:ext uri="{BB962C8B-B14F-4D97-AF65-F5344CB8AC3E}">
-        <p14:creationId xmlns:p14="http://schemas.microsoft.com/office/powerpoint/2010/main" val="3517956807"/>
-      </p:ext>
-    </p:extLst>
-  </p:cSld>
-  <p:clrMapOvr>
-    <a:masterClrMapping/>
-  </p:clrMapOvr>
-</p:sld>
-</file>
-
-<file path=ppt/slides/slide12.xml><?xml version="1.0" encoding="utf-8"?>
-<p:sld xmlns:a="http://schemas.openxmlformats.org/drawingml/2006/main" xmlns:r="http://schemas.openxmlformats.org/officeDocument/2006/relationships" xmlns:p="http://schemas.openxmlformats.org/presentationml/2006/main">
-  <p:cSld>
-    <p:spTree>
-      <p:nvGrpSpPr>
-        <p:cNvPr id="1" name=""/>
-        <p:cNvGrpSpPr/>
-        <p:nvPr/>
-      </p:nvGrpSpPr>
-      <p:grpSpPr>
-        <a:xfrm>
-          <a:off x="0" y="0"/>
-          <a:ext cx="0" cy="0"/>
-          <a:chOff x="0" y="0"/>
-          <a:chExt cx="0" cy="0"/>
-        </a:xfrm>
-      </p:grpSpPr>
-    </p:spTree>
-    <p:extLst>
-      <p:ext uri="{BB962C8B-B14F-4D97-AF65-F5344CB8AC3E}">
-        <p14:creationId xmlns:p14="http://schemas.microsoft.com/office/powerpoint/2010/main" val="3151194547"/>
-      </p:ext>
-    </p:extLst>
-  </p:cSld>
-  <p:clrMapOvr>
-    <a:masterClrMapping/>
-  </p:clrMapOvr>
-</p:sld>
-</file>
-
-<file path=ppt/slides/slide13.xml><?xml version="1.0" encoding="utf-8"?>
-<p:sld xmlns:a="http://schemas.openxmlformats.org/drawingml/2006/main" xmlns:r="http://schemas.openxmlformats.org/officeDocument/2006/relationships" xmlns:p="http://schemas.openxmlformats.org/presentationml/2006/main">
-  <p:cSld>
-    <p:spTree>
-      <p:nvGrpSpPr>
-        <p:cNvPr id="1" name=""/>
-        <p:cNvGrpSpPr/>
-        <p:nvPr/>
-      </p:nvGrpSpPr>
-      <p:grpSpPr>
-        <a:xfrm>
-          <a:off x="0" y="0"/>
-          <a:ext cx="0" cy="0"/>
-          <a:chOff x="0" y="0"/>
-          <a:chExt cx="0" cy="0"/>
-        </a:xfrm>
-      </p:grpSpPr>
-    </p:spTree>
-    <p:extLst>
-      <p:ext uri="{BB962C8B-B14F-4D97-AF65-F5344CB8AC3E}">
-        <p14:creationId xmlns:p14="http://schemas.microsoft.com/office/powerpoint/2010/main" val="1171601078"/>
-      </p:ext>
-    </p:extLst>
-  </p:cSld>
-  <p:clrMapOvr>
-    <a:masterClrMapping/>
-  </p:clrMapOvr>
-</p:sld>
-</file>
-
-<file path=ppt/slides/slide14.xml><?xml version="1.0" encoding="utf-8"?>
-<p:sld xmlns:a="http://schemas.openxmlformats.org/drawingml/2006/main" xmlns:r="http://schemas.openxmlformats.org/officeDocument/2006/relationships" xmlns:p="http://schemas.openxmlformats.org/presentationml/2006/main">
-  <p:cSld>
-    <p:spTree>
-      <p:nvGrpSpPr>
-        <p:cNvPr id="1" name=""/>
-        <p:cNvGrpSpPr/>
-        <p:nvPr/>
-      </p:nvGrpSpPr>
-      <p:grpSpPr>
-        <a:xfrm>
-          <a:off x="0" y="0"/>
-          <a:ext cx="0" cy="0"/>
-          <a:chOff x="0" y="0"/>
-          <a:chExt cx="0" cy="0"/>
-        </a:xfrm>
-      </p:grpSpPr>
-    </p:spTree>
-    <p:extLst>
-      <p:ext uri="{BB962C8B-B14F-4D97-AF65-F5344CB8AC3E}">
-        <p14:creationId xmlns:p14="http://schemas.microsoft.com/office/powerpoint/2010/main" val="66565955"/>
-      </p:ext>
-    </p:extLst>
-  </p:cSld>
-  <p:clrMapOvr>
-    <a:masterClrMapping/>
-  </p:clrMapOvr>
-</p:sld>
-</file>
-
-<file path=ppt/slides/slide15.xml><?xml version="1.0" encoding="utf-8"?>
-<p:sld xmlns:a="http://schemas.openxmlformats.org/drawingml/2006/main" xmlns:r="http://schemas.openxmlformats.org/officeDocument/2006/relationships" xmlns:p="http://schemas.openxmlformats.org/presentationml/2006/main">
-  <p:cSld>
-    <p:spTree>
-      <p:nvGrpSpPr>
-        <p:cNvPr id="1" name=""/>
-        <p:cNvGrpSpPr/>
-        <p:nvPr/>
-      </p:nvGrpSpPr>
-      <p:grpSpPr>
-        <a:xfrm>
-          <a:off x="0" y="0"/>
-          <a:ext cx="0" cy="0"/>
-          <a:chOff x="0" y="0"/>
-          <a:chExt cx="0" cy="0"/>
-        </a:xfrm>
-      </p:grpSpPr>
-    </p:spTree>
-    <p:extLst>
-      <p:ext uri="{BB962C8B-B14F-4D97-AF65-F5344CB8AC3E}">
-        <p14:creationId xmlns:p14="http://schemas.microsoft.com/office/powerpoint/2010/main" val="2927269667"/>
-      </p:ext>
-    </p:extLst>
-  </p:cSld>
-  <p:clrMapOvr>
-    <a:masterClrMapping/>
-  </p:clrMapOvr>
-</p:sld>
-</file>
-
-<file path=ppt/slides/slide16.xml><?xml version="1.0" encoding="utf-8"?>
-<p:sld xmlns:a="http://schemas.openxmlformats.org/drawingml/2006/main" xmlns:r="http://schemas.openxmlformats.org/officeDocument/2006/relationships" xmlns:p="http://schemas.openxmlformats.org/presentationml/2006/main">
-  <p:cSld>
-    <p:spTree>
-      <p:nvGrpSpPr>
-        <p:cNvPr id="1" name=""/>
-        <p:cNvGrpSpPr/>
-        <p:nvPr/>
-      </p:nvGrpSpPr>
-      <p:grpSpPr>
-        <a:xfrm>
-          <a:off x="0" y="0"/>
-          <a:ext cx="0" cy="0"/>
-          <a:chOff x="0" y="0"/>
-          <a:chExt cx="0" cy="0"/>
-        </a:xfrm>
-      </p:grpSpPr>
-    </p:spTree>
-    <p:extLst>
-      <p:ext uri="{BB962C8B-B14F-4D97-AF65-F5344CB8AC3E}">
-        <p14:creationId xmlns:p14="http://schemas.microsoft.com/office/powerpoint/2010/main" val="2666025765"/>
-      </p:ext>
-    </p:extLst>
-  </p:cSld>
-  <p:clrMapOvr>
-    <a:masterClrMapping/>
-  </p:clrMapOvr>
-</p:sld>
-</file>
-
-<file path=ppt/slides/slide17.xml><?xml version="1.0" encoding="utf-8"?>
-<p:sld xmlns:a="http://schemas.openxmlformats.org/drawingml/2006/main" xmlns:r="http://schemas.openxmlformats.org/officeDocument/2006/relationships" xmlns:p="http://schemas.openxmlformats.org/presentationml/2006/main">
-  <p:cSld>
-    <p:spTree>
-      <p:nvGrpSpPr>
-        <p:cNvPr id="1" name=""/>
-        <p:cNvGrpSpPr/>
-        <p:nvPr/>
-      </p:nvGrpSpPr>
-      <p:grpSpPr>
-        <a:xfrm>
-          <a:off x="0" y="0"/>
-          <a:ext cx="0" cy="0"/>
-          <a:chOff x="0" y="0"/>
-          <a:chExt cx="0" cy="0"/>
-        </a:xfrm>
-      </p:grpSpPr>
-    </p:spTree>
-    <p:extLst>
-      <p:ext uri="{BB962C8B-B14F-4D97-AF65-F5344CB8AC3E}">
-        <p14:creationId xmlns:p14="http://schemas.microsoft.com/office/powerpoint/2010/main" val="1469591208"/>
-      </p:ext>
-    </p:extLst>
-  </p:cSld>
-  <p:clrMapOvr>
-    <a:masterClrMapping/>
-  </p:clrMapOvr>
-</p:sld>
-</file>
-
-<file path=ppt/slides/slide18.xml><?xml version="1.0" encoding="utf-8"?>
-<p:sld xmlns:a="http://schemas.openxmlformats.org/drawingml/2006/main" xmlns:r="http://schemas.openxmlformats.org/officeDocument/2006/relationships" xmlns:p="http://schemas.openxmlformats.org/presentationml/2006/main">
-  <p:cSld>
-    <p:spTree>
-      <p:nvGrpSpPr>
-        <p:cNvPr id="1" name=""/>
-        <p:cNvGrpSpPr/>
-        <p:nvPr/>
-      </p:nvGrpSpPr>
-      <p:grpSpPr>
-        <a:xfrm>
-          <a:off x="0" y="0"/>
-          <a:ext cx="0" cy="0"/>
-          <a:chOff x="0" y="0"/>
-          <a:chExt cx="0" cy="0"/>
-        </a:xfrm>
-      </p:grpSpPr>
-    </p:spTree>
-    <p:extLst>
-      <p:ext uri="{BB962C8B-B14F-4D97-AF65-F5344CB8AC3E}">
-        <p14:creationId xmlns:p14="http://schemas.microsoft.com/office/powerpoint/2010/main" val="271190643"/>
-      </p:ext>
-    </p:extLst>
-  </p:cSld>
-  <p:clrMapOvr>
-    <a:masterClrMapping/>
-  </p:clrMapOvr>
-</p:sld>
-</file>
-
-<file path=ppt/slides/slide19.xml><?xml version="1.0" encoding="utf-8"?>
-<p:sld xmlns:a="http://schemas.openxmlformats.org/drawingml/2006/main" xmlns:r="http://schemas.openxmlformats.org/officeDocument/2006/relationships" xmlns:p="http://schemas.openxmlformats.org/presentationml/2006/main">
-  <p:cSld>
-    <p:spTree>
-      <p:nvGrpSpPr>
-        <p:cNvPr id="1" name=""/>
-        <p:cNvGrpSpPr/>
-        <p:nvPr/>
-      </p:nvGrpSpPr>
-      <p:grpSpPr>
-        <a:xfrm>
-          <a:off x="0" y="0"/>
-          <a:ext cx="0" cy="0"/>
-          <a:chOff x="0" y="0"/>
-          <a:chExt cx="0" cy="0"/>
-        </a:xfrm>
-      </p:grpSpPr>
-    </p:spTree>
-    <p:extLst>
-      <p:ext uri="{BB962C8B-B14F-4D97-AF65-F5344CB8AC3E}">
-        <p14:creationId xmlns:p14="http://schemas.microsoft.com/office/powerpoint/2010/main" val="1382220983"/>
-      </p:ext>
-    </p:extLst>
-  </p:cSld>
-  <p:clrMapOvr>
-    <a:masterClrMapping/>
-  </p:clrMapOvr>
-</p:sld>
-</file>
-
 <file path=ppt/slides/slide2.xml><?xml version="1.0" encoding="utf-8"?>
 <p:sld xmlns:a="http://schemas.openxmlformats.org/drawingml/2006/main" xmlns:r="http://schemas.openxmlformats.org/officeDocument/2006/relationships" xmlns:p="http://schemas.openxmlformats.org/presentationml/2006/main">
   <p:cSld>
@@ -9757,306 +9435,6 @@
 </p:sld>
 </file>
 
-<file path=ppt/slides/slide20.xml><?xml version="1.0" encoding="utf-8"?>
-<p:sld xmlns:a="http://schemas.openxmlformats.org/drawingml/2006/main" xmlns:r="http://schemas.openxmlformats.org/officeDocument/2006/relationships" xmlns:p="http://schemas.openxmlformats.org/presentationml/2006/main">
-  <p:cSld>
-    <p:spTree>
-      <p:nvGrpSpPr>
-        <p:cNvPr id="1" name=""/>
-        <p:cNvGrpSpPr/>
-        <p:nvPr/>
-      </p:nvGrpSpPr>
-      <p:grpSpPr>
-        <a:xfrm>
-          <a:off x="0" y="0"/>
-          <a:ext cx="0" cy="0"/>
-          <a:chOff x="0" y="0"/>
-          <a:chExt cx="0" cy="0"/>
-        </a:xfrm>
-      </p:grpSpPr>
-    </p:spTree>
-    <p:extLst>
-      <p:ext uri="{BB962C8B-B14F-4D97-AF65-F5344CB8AC3E}">
-        <p14:creationId xmlns:p14="http://schemas.microsoft.com/office/powerpoint/2010/main" val="2728524241"/>
-      </p:ext>
-    </p:extLst>
-  </p:cSld>
-  <p:clrMapOvr>
-    <a:masterClrMapping/>
-  </p:clrMapOvr>
-</p:sld>
-</file>
-
-<file path=ppt/slides/slide21.xml><?xml version="1.0" encoding="utf-8"?>
-<p:sld xmlns:a="http://schemas.openxmlformats.org/drawingml/2006/main" xmlns:r="http://schemas.openxmlformats.org/officeDocument/2006/relationships" xmlns:p="http://schemas.openxmlformats.org/presentationml/2006/main">
-  <p:cSld>
-    <p:spTree>
-      <p:nvGrpSpPr>
-        <p:cNvPr id="1" name=""/>
-        <p:cNvGrpSpPr/>
-        <p:nvPr/>
-      </p:nvGrpSpPr>
-      <p:grpSpPr>
-        <a:xfrm>
-          <a:off x="0" y="0"/>
-          <a:ext cx="0" cy="0"/>
-          <a:chOff x="0" y="0"/>
-          <a:chExt cx="0" cy="0"/>
-        </a:xfrm>
-      </p:grpSpPr>
-    </p:spTree>
-    <p:extLst>
-      <p:ext uri="{BB962C8B-B14F-4D97-AF65-F5344CB8AC3E}">
-        <p14:creationId xmlns:p14="http://schemas.microsoft.com/office/powerpoint/2010/main" val="2535502301"/>
-      </p:ext>
-    </p:extLst>
-  </p:cSld>
-  <p:clrMapOvr>
-    <a:masterClrMapping/>
-  </p:clrMapOvr>
-</p:sld>
-</file>
-
-<file path=ppt/slides/slide22.xml><?xml version="1.0" encoding="utf-8"?>
-<p:sld xmlns:a="http://schemas.openxmlformats.org/drawingml/2006/main" xmlns:r="http://schemas.openxmlformats.org/officeDocument/2006/relationships" xmlns:p="http://schemas.openxmlformats.org/presentationml/2006/main">
-  <p:cSld>
-    <p:spTree>
-      <p:nvGrpSpPr>
-        <p:cNvPr id="1" name=""/>
-        <p:cNvGrpSpPr/>
-        <p:nvPr/>
-      </p:nvGrpSpPr>
-      <p:grpSpPr>
-        <a:xfrm>
-          <a:off x="0" y="0"/>
-          <a:ext cx="0" cy="0"/>
-          <a:chOff x="0" y="0"/>
-          <a:chExt cx="0" cy="0"/>
-        </a:xfrm>
-      </p:grpSpPr>
-    </p:spTree>
-    <p:extLst>
-      <p:ext uri="{BB962C8B-B14F-4D97-AF65-F5344CB8AC3E}">
-        <p14:creationId xmlns:p14="http://schemas.microsoft.com/office/powerpoint/2010/main" val="1655082981"/>
-      </p:ext>
-    </p:extLst>
-  </p:cSld>
-  <p:clrMapOvr>
-    <a:masterClrMapping/>
-  </p:clrMapOvr>
-</p:sld>
-</file>
-
-<file path=ppt/slides/slide23.xml><?xml version="1.0" encoding="utf-8"?>
-<p:sld xmlns:a="http://schemas.openxmlformats.org/drawingml/2006/main" xmlns:r="http://schemas.openxmlformats.org/officeDocument/2006/relationships" xmlns:p="http://schemas.openxmlformats.org/presentationml/2006/main">
-  <p:cSld>
-    <p:spTree>
-      <p:nvGrpSpPr>
-        <p:cNvPr id="1" name=""/>
-        <p:cNvGrpSpPr/>
-        <p:nvPr/>
-      </p:nvGrpSpPr>
-      <p:grpSpPr>
-        <a:xfrm>
-          <a:off x="0" y="0"/>
-          <a:ext cx="0" cy="0"/>
-          <a:chOff x="0" y="0"/>
-          <a:chExt cx="0" cy="0"/>
-        </a:xfrm>
-      </p:grpSpPr>
-    </p:spTree>
-    <p:extLst>
-      <p:ext uri="{BB962C8B-B14F-4D97-AF65-F5344CB8AC3E}">
-        <p14:creationId xmlns:p14="http://schemas.microsoft.com/office/powerpoint/2010/main" val="3135765955"/>
-      </p:ext>
-    </p:extLst>
-  </p:cSld>
-  <p:clrMapOvr>
-    <a:masterClrMapping/>
-  </p:clrMapOvr>
-</p:sld>
-</file>
-
-<file path=ppt/slides/slide24.xml><?xml version="1.0" encoding="utf-8"?>
-<p:sld xmlns:a="http://schemas.openxmlformats.org/drawingml/2006/main" xmlns:r="http://schemas.openxmlformats.org/officeDocument/2006/relationships" xmlns:p="http://schemas.openxmlformats.org/presentationml/2006/main">
-  <p:cSld>
-    <p:spTree>
-      <p:nvGrpSpPr>
-        <p:cNvPr id="1" name=""/>
-        <p:cNvGrpSpPr/>
-        <p:nvPr/>
-      </p:nvGrpSpPr>
-      <p:grpSpPr>
-        <a:xfrm>
-          <a:off x="0" y="0"/>
-          <a:ext cx="0" cy="0"/>
-          <a:chOff x="0" y="0"/>
-          <a:chExt cx="0" cy="0"/>
-        </a:xfrm>
-      </p:grpSpPr>
-    </p:spTree>
-    <p:extLst>
-      <p:ext uri="{BB962C8B-B14F-4D97-AF65-F5344CB8AC3E}">
-        <p14:creationId xmlns:p14="http://schemas.microsoft.com/office/powerpoint/2010/main" val="3866057627"/>
-      </p:ext>
-    </p:extLst>
-  </p:cSld>
-  <p:clrMapOvr>
-    <a:masterClrMapping/>
-  </p:clrMapOvr>
-</p:sld>
-</file>
-
-<file path=ppt/slides/slide25.xml><?xml version="1.0" encoding="utf-8"?>
-<p:sld xmlns:a="http://schemas.openxmlformats.org/drawingml/2006/main" xmlns:r="http://schemas.openxmlformats.org/officeDocument/2006/relationships" xmlns:p="http://schemas.openxmlformats.org/presentationml/2006/main">
-  <p:cSld>
-    <p:spTree>
-      <p:nvGrpSpPr>
-        <p:cNvPr id="1" name=""/>
-        <p:cNvGrpSpPr/>
-        <p:nvPr/>
-      </p:nvGrpSpPr>
-      <p:grpSpPr>
-        <a:xfrm>
-          <a:off x="0" y="0"/>
-          <a:ext cx="0" cy="0"/>
-          <a:chOff x="0" y="0"/>
-          <a:chExt cx="0" cy="0"/>
-        </a:xfrm>
-      </p:grpSpPr>
-    </p:spTree>
-    <p:extLst>
-      <p:ext uri="{BB962C8B-B14F-4D97-AF65-F5344CB8AC3E}">
-        <p14:creationId xmlns:p14="http://schemas.microsoft.com/office/powerpoint/2010/main" val="2065832412"/>
-      </p:ext>
-    </p:extLst>
-  </p:cSld>
-  <p:clrMapOvr>
-    <a:masterClrMapping/>
-  </p:clrMapOvr>
-</p:sld>
-</file>
-
-<file path=ppt/slides/slide26.xml><?xml version="1.0" encoding="utf-8"?>
-<p:sld xmlns:a="http://schemas.openxmlformats.org/drawingml/2006/main" xmlns:r="http://schemas.openxmlformats.org/officeDocument/2006/relationships" xmlns:p="http://schemas.openxmlformats.org/presentationml/2006/main">
-  <p:cSld>
-    <p:spTree>
-      <p:nvGrpSpPr>
-        <p:cNvPr id="1" name=""/>
-        <p:cNvGrpSpPr/>
-        <p:nvPr/>
-      </p:nvGrpSpPr>
-      <p:grpSpPr>
-        <a:xfrm>
-          <a:off x="0" y="0"/>
-          <a:ext cx="0" cy="0"/>
-          <a:chOff x="0" y="0"/>
-          <a:chExt cx="0" cy="0"/>
-        </a:xfrm>
-      </p:grpSpPr>
-    </p:spTree>
-    <p:extLst>
-      <p:ext uri="{BB962C8B-B14F-4D97-AF65-F5344CB8AC3E}">
-        <p14:creationId xmlns:p14="http://schemas.microsoft.com/office/powerpoint/2010/main" val="4099499880"/>
-      </p:ext>
-    </p:extLst>
-  </p:cSld>
-  <p:clrMapOvr>
-    <a:masterClrMapping/>
-  </p:clrMapOvr>
-</p:sld>
-</file>
-
-<file path=ppt/slides/slide27.xml><?xml version="1.0" encoding="utf-8"?>
-<p:sld xmlns:a="http://schemas.openxmlformats.org/drawingml/2006/main" xmlns:r="http://schemas.openxmlformats.org/officeDocument/2006/relationships" xmlns:p="http://schemas.openxmlformats.org/presentationml/2006/main">
-  <p:cSld>
-    <p:spTree>
-      <p:nvGrpSpPr>
-        <p:cNvPr id="1" name=""/>
-        <p:cNvGrpSpPr/>
-        <p:nvPr/>
-      </p:nvGrpSpPr>
-      <p:grpSpPr>
-        <a:xfrm>
-          <a:off x="0" y="0"/>
-          <a:ext cx="0" cy="0"/>
-          <a:chOff x="0" y="0"/>
-          <a:chExt cx="0" cy="0"/>
-        </a:xfrm>
-      </p:grpSpPr>
-    </p:spTree>
-    <p:extLst>
-      <p:ext uri="{BB962C8B-B14F-4D97-AF65-F5344CB8AC3E}">
-        <p14:creationId xmlns:p14="http://schemas.microsoft.com/office/powerpoint/2010/main" val="3373122463"/>
-      </p:ext>
-    </p:extLst>
-  </p:cSld>
-  <p:clrMapOvr>
-    <a:masterClrMapping/>
-  </p:clrMapOvr>
-</p:sld>
-</file>
-
-<file path=ppt/slides/slide28.xml><?xml version="1.0" encoding="utf-8"?>
-<p:sld xmlns:a="http://schemas.openxmlformats.org/drawingml/2006/main" xmlns:r="http://schemas.openxmlformats.org/officeDocument/2006/relationships" xmlns:p="http://schemas.openxmlformats.org/presentationml/2006/main">
-  <p:cSld>
-    <p:spTree>
-      <p:nvGrpSpPr>
-        <p:cNvPr id="1" name=""/>
-        <p:cNvGrpSpPr/>
-        <p:nvPr/>
-      </p:nvGrpSpPr>
-      <p:grpSpPr>
-        <a:xfrm>
-          <a:off x="0" y="0"/>
-          <a:ext cx="0" cy="0"/>
-          <a:chOff x="0" y="0"/>
-          <a:chExt cx="0" cy="0"/>
-        </a:xfrm>
-      </p:grpSpPr>
-    </p:spTree>
-    <p:extLst>
-      <p:ext uri="{BB962C8B-B14F-4D97-AF65-F5344CB8AC3E}">
-        <p14:creationId xmlns:p14="http://schemas.microsoft.com/office/powerpoint/2010/main" val="1119157696"/>
-      </p:ext>
-    </p:extLst>
-  </p:cSld>
-  <p:clrMapOvr>
-    <a:masterClrMapping/>
-  </p:clrMapOvr>
-</p:sld>
-</file>
-
-<file path=ppt/slides/slide29.xml><?xml version="1.0" encoding="utf-8"?>
-<p:sld xmlns:a="http://schemas.openxmlformats.org/drawingml/2006/main" xmlns:r="http://schemas.openxmlformats.org/officeDocument/2006/relationships" xmlns:p="http://schemas.openxmlformats.org/presentationml/2006/main">
-  <p:cSld>
-    <p:spTree>
-      <p:nvGrpSpPr>
-        <p:cNvPr id="1" name=""/>
-        <p:cNvGrpSpPr/>
-        <p:nvPr/>
-      </p:nvGrpSpPr>
-      <p:grpSpPr>
-        <a:xfrm>
-          <a:off x="0" y="0"/>
-          <a:ext cx="0" cy="0"/>
-          <a:chOff x="0" y="0"/>
-          <a:chExt cx="0" cy="0"/>
-        </a:xfrm>
-      </p:grpSpPr>
-    </p:spTree>
-    <p:extLst>
-      <p:ext uri="{BB962C8B-B14F-4D97-AF65-F5344CB8AC3E}">
-        <p14:creationId xmlns:p14="http://schemas.microsoft.com/office/powerpoint/2010/main" val="3975575233"/>
-      </p:ext>
-    </p:extLst>
-  </p:cSld>
-  <p:clrMapOvr>
-    <a:masterClrMapping/>
-  </p:clrMapOvr>
-</p:sld>
-</file>
-
 <file path=ppt/slides/slide3.xml><?xml version="1.0" encoding="utf-8"?>
 <p:sld xmlns:a="http://schemas.openxmlformats.org/drawingml/2006/main" xmlns:r="http://schemas.openxmlformats.org/officeDocument/2006/relationships" xmlns:p="http://schemas.openxmlformats.org/presentationml/2006/main">
   <p:cSld>
@@ -10348,66 +9726,6 @@
     <p:extLst>
       <p:ext uri="{BB962C8B-B14F-4D97-AF65-F5344CB8AC3E}">
         <p14:creationId xmlns:p14="http://schemas.microsoft.com/office/powerpoint/2010/main" val="3688504626"/>
-      </p:ext>
-    </p:extLst>
-  </p:cSld>
-  <p:clrMapOvr>
-    <a:masterClrMapping/>
-  </p:clrMapOvr>
-</p:sld>
-</file>
-
-<file path=ppt/slides/slide30.xml><?xml version="1.0" encoding="utf-8"?>
-<p:sld xmlns:a="http://schemas.openxmlformats.org/drawingml/2006/main" xmlns:r="http://schemas.openxmlformats.org/officeDocument/2006/relationships" xmlns:p="http://schemas.openxmlformats.org/presentationml/2006/main">
-  <p:cSld>
-    <p:spTree>
-      <p:nvGrpSpPr>
-        <p:cNvPr id="1" name=""/>
-        <p:cNvGrpSpPr/>
-        <p:nvPr/>
-      </p:nvGrpSpPr>
-      <p:grpSpPr>
-        <a:xfrm>
-          <a:off x="0" y="0"/>
-          <a:ext cx="0" cy="0"/>
-          <a:chOff x="0" y="0"/>
-          <a:chExt cx="0" cy="0"/>
-        </a:xfrm>
-      </p:grpSpPr>
-    </p:spTree>
-    <p:extLst>
-      <p:ext uri="{BB962C8B-B14F-4D97-AF65-F5344CB8AC3E}">
-        <p14:creationId xmlns:p14="http://schemas.microsoft.com/office/powerpoint/2010/main" val="3963866453"/>
-      </p:ext>
-    </p:extLst>
-  </p:cSld>
-  <p:clrMapOvr>
-    <a:masterClrMapping/>
-  </p:clrMapOvr>
-</p:sld>
-</file>
-
-<file path=ppt/slides/slide31.xml><?xml version="1.0" encoding="utf-8"?>
-<p:sld xmlns:a="http://schemas.openxmlformats.org/drawingml/2006/main" xmlns:r="http://schemas.openxmlformats.org/officeDocument/2006/relationships" xmlns:p="http://schemas.openxmlformats.org/presentationml/2006/main">
-  <p:cSld>
-    <p:spTree>
-      <p:nvGrpSpPr>
-        <p:cNvPr id="1" name=""/>
-        <p:cNvGrpSpPr/>
-        <p:nvPr/>
-      </p:nvGrpSpPr>
-      <p:grpSpPr>
-        <a:xfrm>
-          <a:off x="0" y="0"/>
-          <a:ext cx="0" cy="0"/>
-          <a:chOff x="0" y="0"/>
-          <a:chExt cx="0" cy="0"/>
-        </a:xfrm>
-      </p:grpSpPr>
-    </p:spTree>
-    <p:extLst>
-      <p:ext uri="{BB962C8B-B14F-4D97-AF65-F5344CB8AC3E}">
-        <p14:creationId xmlns:p14="http://schemas.microsoft.com/office/powerpoint/2010/main" val="3347810453"/>
       </p:ext>
     </p:extLst>
   </p:cSld>
@@ -12476,6 +11794,15 @@
 </file>
 
 <file path=customXml/item1.xml><?xml version="1.0" encoding="utf-8"?>
+<?mso-contentType ?>
+<FormTemplates xmlns="http://schemas.microsoft.com/sharepoint/v3/contenttype/forms">
+  <Display>DocumentLibraryForm</Display>
+  <Edit>DocumentLibraryForm</Edit>
+  <New>DocumentLibraryForm</New>
+</FormTemplates>
+</file>
+
+<file path=customXml/item2.xml><?xml version="1.0" encoding="utf-8"?>
 <ct:contentTypeSchema xmlns:ct="http://schemas.microsoft.com/office/2006/metadata/contentType" xmlns:ma="http://schemas.microsoft.com/office/2006/metadata/properties/metaAttributes" ct:_="" ma:_="" ma:contentTypeName="Document" ma:contentTypeID="0x010100537481E1DCCBB043A7E4880321167946" ma:contentTypeVersion="7" ma:contentTypeDescription="Create a new document." ma:contentTypeScope="" ma:versionID="20916a4356fb234729af2e2a3a7b86a0">
   <xsd:schema xmlns:xsd="http://www.w3.org/2001/XMLSchema" xmlns:xs="http://www.w3.org/2001/XMLSchema" xmlns:p="http://schemas.microsoft.com/office/2006/metadata/properties" xmlns:ns3="c412834d-558c-4c65-b217-eae0caaedaf9" xmlns:ns4="a4657121-eab7-457a-b950-481e5c737d88" targetNamespace="http://schemas.microsoft.com/office/2006/metadata/properties" ma:root="true" ma:fieldsID="38bbac1585e77e12c4f1eb4078040474" ns3:_="" ns4:_="">
     <xsd:import namespace="c412834d-558c-4c65-b217-eae0caaedaf9"/>
@@ -12658,15 +11985,6 @@
 </ct:contentTypeSchema>
 </file>
 
-<file path=customXml/item2.xml><?xml version="1.0" encoding="utf-8"?>
-<?mso-contentType ?>
-<FormTemplates xmlns="http://schemas.microsoft.com/sharepoint/v3/contenttype/forms">
-  <Display>DocumentLibraryForm</Display>
-  <Edit>DocumentLibraryForm</Edit>
-  <New>DocumentLibraryForm</New>
-</FormTemplates>
-</file>
-
 <file path=customXml/item3.xml><?xml version="1.0" encoding="utf-8"?>
 <p:properties xmlns:p="http://schemas.microsoft.com/office/2006/metadata/properties" xmlns:xsi="http://www.w3.org/2001/XMLSchema-instance" xmlns:pc="http://schemas.microsoft.com/office/infopath/2007/PartnerControls">
   <documentManagement>
@@ -12676,6 +11994,14 @@
 </file>
 
 <file path=customXml/itemProps1.xml><?xml version="1.0" encoding="utf-8"?>
+<ds:datastoreItem xmlns:ds="http://schemas.openxmlformats.org/officeDocument/2006/customXml" ds:itemID="{7B3FAE09-0CA1-44B4-B808-270E96EF55B3}">
+  <ds:schemaRefs>
+    <ds:schemaRef ds:uri="http://schemas.microsoft.com/sharepoint/v3/contenttype/forms"/>
+  </ds:schemaRefs>
+</ds:datastoreItem>
+</file>
+
+<file path=customXml/itemProps2.xml><?xml version="1.0" encoding="utf-8"?>
 <ds:datastoreItem xmlns:ds="http://schemas.openxmlformats.org/officeDocument/2006/customXml" ds:itemID="{53CE430F-E8A0-49B2-9C0C-50B78D94FD5F}">
   <ds:schemaRefs>
     <ds:schemaRef ds:uri="http://schemas.microsoft.com/office/2006/metadata/contentType"/>
@@ -12690,14 +12016,6 @@
     <ds:schemaRef ds:uri="http://purl.org/dc/elements/1.1/"/>
     <ds:schemaRef ds:uri="http://purl.org/dc/terms/"/>
     <ds:schemaRef ds:uri="http://schemas.microsoft.com/internal/obd"/>
-  </ds:schemaRefs>
-</ds:datastoreItem>
-</file>
-
-<file path=customXml/itemProps2.xml><?xml version="1.0" encoding="utf-8"?>
-<ds:datastoreItem xmlns:ds="http://schemas.openxmlformats.org/officeDocument/2006/customXml" ds:itemID="{7B3FAE09-0CA1-44B4-B808-270E96EF55B3}">
-  <ds:schemaRefs>
-    <ds:schemaRef ds:uri="http://schemas.microsoft.com/sharepoint/v3/contenttype/forms"/>
   </ds:schemaRefs>
 </ds:datastoreItem>
 </file>

</xml_diff>